<commit_message>
Fixed several typos.  No new material.
</commit_message>
<xml_diff>
--- a/docs/project_management/internal_meetings/caI2 – Iteration c1 - kickoff meeting.pptx
+++ b/docs/project_management/internal_meetings/caI2 – Iteration c1 - kickoff meeting.pptx
@@ -295,9 +295,9 @@
             <a:fld id="{CEF468C5-A8C9-4AFD-978A-820BE0D24767}" type="datetimeFigureOut">
               <a:rPr lang="en-US" smtClean="0"/>
               <a:pPr/>
-              <a:t>10/1/2008</a:t>
+              <a:t>1/5/2009</a:t>
             </a:fld>
-            <a:endParaRPr lang="en-US"/>
+            <a:endParaRPr lang="en-US" dirty="0"/>
           </a:p>
         </p:txBody>
       </p:sp>
@@ -316,7 +316,7 @@
           <a:bodyPr/>
           <a:lstStyle/>
           <a:p>
-            <a:endParaRPr lang="en-US"/>
+            <a:endParaRPr lang="en-US" dirty="0"/>
           </a:p>
         </p:txBody>
       </p:sp>
@@ -340,7 +340,7 @@
               <a:pPr/>
               <a:t>‹#›</a:t>
             </a:fld>
-            <a:endParaRPr lang="en-US"/>
+            <a:endParaRPr lang="en-US" dirty="0"/>
           </a:p>
         </p:txBody>
       </p:sp>
@@ -462,9 +462,9 @@
             <a:fld id="{CEF468C5-A8C9-4AFD-978A-820BE0D24767}" type="datetimeFigureOut">
               <a:rPr lang="en-US" smtClean="0"/>
               <a:pPr/>
-              <a:t>10/1/2008</a:t>
+              <a:t>1/5/2009</a:t>
             </a:fld>
-            <a:endParaRPr lang="en-US"/>
+            <a:endParaRPr lang="en-US" dirty="0"/>
           </a:p>
         </p:txBody>
       </p:sp>
@@ -483,7 +483,7 @@
           <a:bodyPr/>
           <a:lstStyle/>
           <a:p>
-            <a:endParaRPr lang="en-US"/>
+            <a:endParaRPr lang="en-US" dirty="0"/>
           </a:p>
         </p:txBody>
       </p:sp>
@@ -507,7 +507,7 @@
               <a:pPr/>
               <a:t>‹#›</a:t>
             </a:fld>
-            <a:endParaRPr lang="en-US"/>
+            <a:endParaRPr lang="en-US" dirty="0"/>
           </a:p>
         </p:txBody>
       </p:sp>
@@ -639,9 +639,9 @@
             <a:fld id="{CEF468C5-A8C9-4AFD-978A-820BE0D24767}" type="datetimeFigureOut">
               <a:rPr lang="en-US" smtClean="0"/>
               <a:pPr/>
-              <a:t>10/1/2008</a:t>
+              <a:t>1/5/2009</a:t>
             </a:fld>
-            <a:endParaRPr lang="en-US"/>
+            <a:endParaRPr lang="en-US" dirty="0"/>
           </a:p>
         </p:txBody>
       </p:sp>
@@ -660,7 +660,7 @@
           <a:bodyPr/>
           <a:lstStyle/>
           <a:p>
-            <a:endParaRPr lang="en-US"/>
+            <a:endParaRPr lang="en-US" dirty="0"/>
           </a:p>
         </p:txBody>
       </p:sp>
@@ -684,7 +684,7 @@
               <a:pPr/>
               <a:t>‹#›</a:t>
             </a:fld>
-            <a:endParaRPr lang="en-US"/>
+            <a:endParaRPr lang="en-US" dirty="0"/>
           </a:p>
         </p:txBody>
       </p:sp>
@@ -806,9 +806,9 @@
             <a:fld id="{CEF468C5-A8C9-4AFD-978A-820BE0D24767}" type="datetimeFigureOut">
               <a:rPr lang="en-US" smtClean="0"/>
               <a:pPr/>
-              <a:t>10/1/2008</a:t>
+              <a:t>1/5/2009</a:t>
             </a:fld>
-            <a:endParaRPr lang="en-US"/>
+            <a:endParaRPr lang="en-US" dirty="0"/>
           </a:p>
         </p:txBody>
       </p:sp>
@@ -827,7 +827,7 @@
           <a:bodyPr/>
           <a:lstStyle/>
           <a:p>
-            <a:endParaRPr lang="en-US"/>
+            <a:endParaRPr lang="en-US" dirty="0"/>
           </a:p>
         </p:txBody>
       </p:sp>
@@ -851,7 +851,7 @@
               <a:pPr/>
               <a:t>‹#›</a:t>
             </a:fld>
-            <a:endParaRPr lang="en-US"/>
+            <a:endParaRPr lang="en-US" dirty="0"/>
           </a:p>
         </p:txBody>
       </p:sp>
@@ -1049,9 +1049,9 @@
             <a:fld id="{CEF468C5-A8C9-4AFD-978A-820BE0D24767}" type="datetimeFigureOut">
               <a:rPr lang="en-US" smtClean="0"/>
               <a:pPr/>
-              <a:t>10/1/2008</a:t>
+              <a:t>1/5/2009</a:t>
             </a:fld>
-            <a:endParaRPr lang="en-US"/>
+            <a:endParaRPr lang="en-US" dirty="0"/>
           </a:p>
         </p:txBody>
       </p:sp>
@@ -1070,7 +1070,7 @@
           <a:bodyPr/>
           <a:lstStyle/>
           <a:p>
-            <a:endParaRPr lang="en-US"/>
+            <a:endParaRPr lang="en-US" dirty="0"/>
           </a:p>
         </p:txBody>
       </p:sp>
@@ -1094,7 +1094,7 @@
               <a:pPr/>
               <a:t>‹#›</a:t>
             </a:fld>
-            <a:endParaRPr lang="en-US"/>
+            <a:endParaRPr lang="en-US" dirty="0"/>
           </a:p>
         </p:txBody>
       </p:sp>
@@ -1334,9 +1334,9 @@
             <a:fld id="{CEF468C5-A8C9-4AFD-978A-820BE0D24767}" type="datetimeFigureOut">
               <a:rPr lang="en-US" smtClean="0"/>
               <a:pPr/>
-              <a:t>10/1/2008</a:t>
+              <a:t>1/5/2009</a:t>
             </a:fld>
-            <a:endParaRPr lang="en-US"/>
+            <a:endParaRPr lang="en-US" dirty="0"/>
           </a:p>
         </p:txBody>
       </p:sp>
@@ -1355,7 +1355,7 @@
           <a:bodyPr/>
           <a:lstStyle/>
           <a:p>
-            <a:endParaRPr lang="en-US"/>
+            <a:endParaRPr lang="en-US" dirty="0"/>
           </a:p>
         </p:txBody>
       </p:sp>
@@ -1379,7 +1379,7 @@
               <a:pPr/>
               <a:t>‹#›</a:t>
             </a:fld>
-            <a:endParaRPr lang="en-US"/>
+            <a:endParaRPr lang="en-US" dirty="0"/>
           </a:p>
         </p:txBody>
       </p:sp>
@@ -1753,9 +1753,9 @@
             <a:fld id="{CEF468C5-A8C9-4AFD-978A-820BE0D24767}" type="datetimeFigureOut">
               <a:rPr lang="en-US" smtClean="0"/>
               <a:pPr/>
-              <a:t>10/1/2008</a:t>
+              <a:t>1/5/2009</a:t>
             </a:fld>
-            <a:endParaRPr lang="en-US"/>
+            <a:endParaRPr lang="en-US" dirty="0"/>
           </a:p>
         </p:txBody>
       </p:sp>
@@ -1774,7 +1774,7 @@
           <a:bodyPr/>
           <a:lstStyle/>
           <a:p>
-            <a:endParaRPr lang="en-US"/>
+            <a:endParaRPr lang="en-US" dirty="0"/>
           </a:p>
         </p:txBody>
       </p:sp>
@@ -1798,7 +1798,7 @@
               <a:pPr/>
               <a:t>‹#›</a:t>
             </a:fld>
-            <a:endParaRPr lang="en-US"/>
+            <a:endParaRPr lang="en-US" dirty="0"/>
           </a:p>
         </p:txBody>
       </p:sp>
@@ -1868,9 +1868,9 @@
             <a:fld id="{CEF468C5-A8C9-4AFD-978A-820BE0D24767}" type="datetimeFigureOut">
               <a:rPr lang="en-US" smtClean="0"/>
               <a:pPr/>
-              <a:t>10/1/2008</a:t>
+              <a:t>1/5/2009</a:t>
             </a:fld>
-            <a:endParaRPr lang="en-US"/>
+            <a:endParaRPr lang="en-US" dirty="0"/>
           </a:p>
         </p:txBody>
       </p:sp>
@@ -1889,7 +1889,7 @@
           <a:bodyPr/>
           <a:lstStyle/>
           <a:p>
-            <a:endParaRPr lang="en-US"/>
+            <a:endParaRPr lang="en-US" dirty="0"/>
           </a:p>
         </p:txBody>
       </p:sp>
@@ -1913,7 +1913,7 @@
               <a:pPr/>
               <a:t>‹#›</a:t>
             </a:fld>
-            <a:endParaRPr lang="en-US"/>
+            <a:endParaRPr lang="en-US" dirty="0"/>
           </a:p>
         </p:txBody>
       </p:sp>
@@ -1960,9 +1960,9 @@
             <a:fld id="{CEF468C5-A8C9-4AFD-978A-820BE0D24767}" type="datetimeFigureOut">
               <a:rPr lang="en-US" smtClean="0"/>
               <a:pPr/>
-              <a:t>10/1/2008</a:t>
+              <a:t>1/5/2009</a:t>
             </a:fld>
-            <a:endParaRPr lang="en-US"/>
+            <a:endParaRPr lang="en-US" dirty="0"/>
           </a:p>
         </p:txBody>
       </p:sp>
@@ -1981,7 +1981,7 @@
           <a:bodyPr/>
           <a:lstStyle/>
           <a:p>
-            <a:endParaRPr lang="en-US"/>
+            <a:endParaRPr lang="en-US" dirty="0"/>
           </a:p>
         </p:txBody>
       </p:sp>
@@ -2005,7 +2005,7 @@
               <a:pPr/>
               <a:t>‹#›</a:t>
             </a:fld>
-            <a:endParaRPr lang="en-US"/>
+            <a:endParaRPr lang="en-US" dirty="0"/>
           </a:p>
         </p:txBody>
       </p:sp>
@@ -2234,9 +2234,9 @@
             <a:fld id="{CEF468C5-A8C9-4AFD-978A-820BE0D24767}" type="datetimeFigureOut">
               <a:rPr lang="en-US" smtClean="0"/>
               <a:pPr/>
-              <a:t>10/1/2008</a:t>
+              <a:t>1/5/2009</a:t>
             </a:fld>
-            <a:endParaRPr lang="en-US"/>
+            <a:endParaRPr lang="en-US" dirty="0"/>
           </a:p>
         </p:txBody>
       </p:sp>
@@ -2255,7 +2255,7 @@
           <a:bodyPr/>
           <a:lstStyle/>
           <a:p>
-            <a:endParaRPr lang="en-US"/>
+            <a:endParaRPr lang="en-US" dirty="0"/>
           </a:p>
         </p:txBody>
       </p:sp>
@@ -2279,7 +2279,7 @@
               <a:pPr/>
               <a:t>‹#›</a:t>
             </a:fld>
-            <a:endParaRPr lang="en-US"/>
+            <a:endParaRPr lang="en-US" dirty="0"/>
           </a:p>
         </p:txBody>
       </p:sp>
@@ -2397,7 +2397,7 @@
             </a:lvl9pPr>
           </a:lstStyle>
           <a:p>
-            <a:endParaRPr lang="en-US"/>
+            <a:endParaRPr lang="en-US" dirty="0"/>
           </a:p>
         </p:txBody>
       </p:sp>
@@ -2484,9 +2484,9 @@
             <a:fld id="{CEF468C5-A8C9-4AFD-978A-820BE0D24767}" type="datetimeFigureOut">
               <a:rPr lang="en-US" smtClean="0"/>
               <a:pPr/>
-              <a:t>10/1/2008</a:t>
+              <a:t>1/5/2009</a:t>
             </a:fld>
-            <a:endParaRPr lang="en-US"/>
+            <a:endParaRPr lang="en-US" dirty="0"/>
           </a:p>
         </p:txBody>
       </p:sp>
@@ -2505,7 +2505,7 @@
           <a:bodyPr/>
           <a:lstStyle/>
           <a:p>
-            <a:endParaRPr lang="en-US"/>
+            <a:endParaRPr lang="en-US" dirty="0"/>
           </a:p>
         </p:txBody>
       </p:sp>
@@ -2529,7 +2529,7 @@
               <a:pPr/>
               <a:t>‹#›</a:t>
             </a:fld>
-            <a:endParaRPr lang="en-US"/>
+            <a:endParaRPr lang="en-US" dirty="0"/>
           </a:p>
         </p:txBody>
       </p:sp>
@@ -2694,9 +2694,9 @@
             <a:fld id="{CEF468C5-A8C9-4AFD-978A-820BE0D24767}" type="datetimeFigureOut">
               <a:rPr lang="en-US" smtClean="0"/>
               <a:pPr/>
-              <a:t>10/1/2008</a:t>
+              <a:t>1/5/2009</a:t>
             </a:fld>
-            <a:endParaRPr lang="en-US"/>
+            <a:endParaRPr lang="en-US" dirty="0"/>
           </a:p>
         </p:txBody>
       </p:sp>
@@ -2733,7 +2733,7 @@
             </a:lvl1pPr>
           </a:lstStyle>
           <a:p>
-            <a:endParaRPr lang="en-US"/>
+            <a:endParaRPr lang="en-US" dirty="0"/>
           </a:p>
         </p:txBody>
       </p:sp>
@@ -2775,7 +2775,7 @@
               <a:pPr/>
               <a:t>‹#›</a:t>
             </a:fld>
-            <a:endParaRPr lang="en-US"/>
+            <a:endParaRPr lang="en-US" dirty="0"/>
           </a:p>
         </p:txBody>
       </p:sp>
@@ -3324,15 +3324,27 @@
           <a:p>
             <a:r>
               <a:rPr lang="en-US" dirty="0" smtClean="0"/>
-              <a:t>Iteration and Use Stories will be tracked using </a:t>
-            </a:r>
-            <a:r>
-              <a:rPr lang="en-US" dirty="0" err="1" smtClean="0"/>
-              <a:t>Gforge</a:t>
-            </a:r>
-            <a:r>
-              <a:rPr lang="en-US" dirty="0" smtClean="0"/>
-              <a:t> Implementation Items.</a:t>
+              <a:t>Iteration and </a:t>
+            </a:r>
+            <a:r>
+              <a:rPr lang="en-US" dirty="0" smtClean="0"/>
+              <a:t>User </a:t>
+            </a:r>
+            <a:r>
+              <a:rPr lang="en-US" dirty="0" smtClean="0"/>
+              <a:t>Stories will be tracked using </a:t>
+            </a:r>
+            <a:r>
+              <a:rPr lang="en-US" dirty="0" smtClean="0"/>
+              <a:t>GForge</a:t>
+            </a:r>
+            <a:r>
+              <a:rPr lang="en-US" dirty="0" smtClean="0"/>
+              <a:t> </a:t>
+            </a:r>
+            <a:r>
+              <a:rPr lang="en-US" dirty="0" smtClean="0"/>
+              <a:t>Implementation Items.</a:t>
             </a:r>
             <a:endParaRPr lang="en-US" dirty="0"/>
           </a:p>
@@ -3470,20 +3482,20 @@
               <a:t>Downside:  User Stories are not intended to describe all possible </a:t>
             </a:r>
             <a:r>
-              <a:rPr lang="en-US" dirty="0" err="1" smtClean="0"/>
-              <a:t>touchpoints</a:t>
-            </a:r>
-            <a:r>
-              <a:rPr lang="en-US" dirty="0" smtClean="0"/>
-              <a:t> to other User Stories and the system architecture.  This could lead to fragmentation of the user experience as well as the code base.  We’ll address this with two new </a:t>
-            </a:r>
-            <a:r>
-              <a:rPr lang="en-US" dirty="0" err="1" smtClean="0"/>
-              <a:t>develop.ment</a:t>
-            </a:r>
-            <a:r>
-              <a:rPr lang="en-US" dirty="0" smtClean="0"/>
-              <a:t> checkpoints “Approach Brainstorming” and “Peer Review”</a:t>
+              <a:rPr lang="en-US" dirty="0" smtClean="0"/>
+              <a:t>touch points </a:t>
+            </a:r>
+            <a:r>
+              <a:rPr lang="en-US" dirty="0" smtClean="0"/>
+              <a:t>to other User Stories and the system architecture.  This could lead to fragmentation of the user experience as well as the code base.  We’ll address this with two new </a:t>
+            </a:r>
+            <a:r>
+              <a:rPr lang="en-US" dirty="0" smtClean="0"/>
+              <a:t>development </a:t>
+            </a:r>
+            <a:r>
+              <a:rPr lang="en-US" dirty="0" smtClean="0"/>
+              <a:t>checkpoints “Approach Brainstorming” and “Peer Review”</a:t>
             </a:r>
             <a:endParaRPr lang="en-US" dirty="0"/>
           </a:p>
@@ -3593,12 +3605,12 @@
               <a:t>short </a:t>
             </a:r>
             <a:r>
-              <a:rPr lang="en-US" dirty="0" err="1" smtClean="0"/>
-              <a:t>whiteboarding</a:t>
-            </a:r>
-            <a:r>
-              <a:rPr lang="en-US" dirty="0" smtClean="0"/>
-              <a:t> session (</a:t>
+              <a:rPr lang="en-US" dirty="0" smtClean="0"/>
+              <a:t>white boarding </a:t>
+            </a:r>
+            <a:r>
+              <a:rPr lang="en-US" dirty="0" smtClean="0"/>
+              <a:t>session (</a:t>
             </a:r>
             <a:r>
               <a:rPr lang="en-US" dirty="0"/>
@@ -3627,7 +3639,7 @@
           <a:p>
             <a:pPr lvl="1"/>
             <a:r>
-              <a:rPr lang="en-US" dirty="0" err="1" smtClean="0"/>
+              <a:rPr lang="en-US" dirty="0" smtClean="0"/>
               <a:t>Centra</a:t>
             </a:r>
             <a:r>
@@ -3635,12 +3647,12 @@
               <a:t> has a </a:t>
             </a:r>
             <a:r>
-              <a:rPr lang="en-US" dirty="0" err="1" smtClean="0"/>
-              <a:t>whiteboarding</a:t>
-            </a:r>
-            <a:r>
-              <a:rPr lang="en-US" dirty="0" smtClean="0"/>
-              <a:t> tool.</a:t>
+              <a:rPr lang="en-US" dirty="0" smtClean="0"/>
+              <a:t>white boarding </a:t>
+            </a:r>
+            <a:r>
+              <a:rPr lang="en-US" dirty="0" smtClean="0"/>
+              <a:t>tool.</a:t>
             </a:r>
           </a:p>
           <a:p>
@@ -3667,12 +3679,12 @@
               <a:t>is complete when the approach is agreed on by the attendees and the </a:t>
             </a:r>
             <a:r>
-              <a:rPr lang="en-US" dirty="0" err="1"/>
-              <a:t>implementor</a:t>
+              <a:rPr lang="en-US" dirty="0" smtClean="0"/>
+              <a:t>implementer </a:t>
             </a:r>
             <a:r>
               <a:rPr lang="en-US" dirty="0"/>
-              <a:t> understands the approach well enough to begin </a:t>
+              <a:t>understands the approach well enough to begin </a:t>
             </a:r>
             <a:r>
               <a:rPr lang="en-US" dirty="0" smtClean="0"/>
@@ -3761,15 +3773,7 @@
           <a:p>
             <a:r>
               <a:rPr lang="en-US" dirty="0" smtClean="0"/>
-              <a:t>occurs </a:t>
-            </a:r>
-            <a:r>
-              <a:rPr lang="en-US" dirty="0" smtClean="0"/>
-              <a:t>before any subversion commit</a:t>
-            </a:r>
-            <a:r>
-              <a:rPr lang="en-US" dirty="0" smtClean="0"/>
-              <a:t>.</a:t>
+              <a:t>occurs before any subversion commit.</a:t>
             </a:r>
           </a:p>
           <a:p>
@@ -3778,7 +3782,6 @@
               <a:rPr lang="en-US" dirty="0" smtClean="0"/>
               <a:t>[Suggested Practice:  commit code as frequently as you can without breaking existing functionality.]</a:t>
             </a:r>
-            <a:endParaRPr lang="en-US" dirty="0" smtClean="0"/>
           </a:p>
           <a:p>
             <a:r>
@@ -3830,11 +3833,7 @@
           <a:p>
             <a:r>
               <a:rPr lang="en-US" dirty="0" smtClean="0"/>
-              <a:t>done via </a:t>
-            </a:r>
-            <a:r>
-              <a:rPr lang="en-US" dirty="0" smtClean="0"/>
-              <a:t>a visit </a:t>
+              <a:t>done via a visit </a:t>
             </a:r>
             <a:r>
               <a:rPr lang="en-US" dirty="0"/>
@@ -3845,62 +3844,38 @@
               <a:t>or </a:t>
             </a:r>
             <a:r>
-              <a:rPr lang="en-US" dirty="0" err="1" smtClean="0"/>
-              <a:t>centra</a:t>
-            </a:r>
-            <a:r>
-              <a:rPr lang="en-US" dirty="0" smtClean="0"/>
-              <a:t> session </a:t>
-            </a:r>
-            <a:r>
-              <a:rPr lang="en-US" dirty="0" smtClean="0"/>
-              <a:t>or email.</a:t>
+              <a:rPr lang="en-US" dirty="0" smtClean="0"/>
+              <a:t>Centra</a:t>
+            </a:r>
+            <a:r>
+              <a:rPr lang="en-US" dirty="0" smtClean="0"/>
+              <a:t> </a:t>
+            </a:r>
+            <a:r>
+              <a:rPr lang="en-US" dirty="0" smtClean="0"/>
+              <a:t>session or email.</a:t>
             </a:r>
           </a:p>
           <a:p>
             <a:pPr lvl="1"/>
             <a:r>
               <a:rPr lang="en-US" dirty="0" smtClean="0"/>
-              <a:t>[Suggested Practice</a:t>
-            </a:r>
-            <a:r>
-              <a:rPr lang="en-US" smtClean="0"/>
-              <a:t>: </a:t>
-            </a:r>
-            <a:r>
-              <a:rPr lang="en-US" smtClean="0"/>
-              <a:t>review </a:t>
-            </a:r>
-            <a:r>
-              <a:rPr lang="en-US" dirty="0" smtClean="0"/>
-              <a:t>the </a:t>
-            </a:r>
-            <a:r>
-              <a:rPr lang="en-US" dirty="0" smtClean="0"/>
-              <a:t>Eclipse </a:t>
-            </a:r>
-            <a:r>
-              <a:rPr lang="en-US" smtClean="0"/>
-              <a:t>diff.]</a:t>
-            </a:r>
-            <a:endParaRPr lang="en-US" dirty="0"/>
-          </a:p>
-          <a:p>
-            <a:r>
-              <a:rPr lang="en-US" dirty="0" smtClean="0"/>
-              <a:t>required </a:t>
-            </a:r>
-            <a:r>
-              <a:rPr lang="en-US" dirty="0" smtClean="0"/>
-              <a:t>attendees are the </a:t>
-            </a:r>
-            <a:r>
-              <a:rPr lang="en-US" dirty="0" err="1" smtClean="0"/>
-              <a:t>implementor</a:t>
-            </a:r>
-            <a:r>
-              <a:rPr lang="en-US" dirty="0" smtClean="0"/>
-              <a:t> and the architect (Eric, with JP as backup)</a:t>
+              <a:t>[Suggested Practice: review the Eclipse diff.]</a:t>
+            </a:r>
+            <a:endParaRPr lang="en-US" dirty="0"/>
+          </a:p>
+          <a:p>
+            <a:r>
+              <a:rPr lang="en-US" dirty="0" smtClean="0"/>
+              <a:t>required attendees are the </a:t>
+            </a:r>
+            <a:r>
+              <a:rPr lang="en-US" dirty="0" smtClean="0"/>
+              <a:t>implementer </a:t>
+            </a:r>
+            <a:r>
+              <a:rPr lang="en-US" dirty="0" smtClean="0"/>
+              <a:t>and the architect (Eric, with JP as backup)</a:t>
             </a:r>
           </a:p>
           <a:p>
@@ -3932,15 +3907,15 @@
             </a:r>
             <a:r>
               <a:rPr lang="en-US" dirty="0"/>
-              <a:t>there improvements that could be made or existing tools that could improve the code? This is to help us all expand our skills (e.g., did you know you could use the Apache commons-</a:t>
-            </a:r>
-            <a:r>
-              <a:rPr lang="en-US" dirty="0" err="1"/>
-              <a:t>lang</a:t>
+              <a:t>there improvements that could be made or existing tools that could improve the code? This is to help us all expand our skills (e.g., did you know you could use the Apache </a:t>
+            </a:r>
+            <a:r>
+              <a:rPr lang="en-US" dirty="0" smtClean="0"/>
+              <a:t>commons-lib </a:t>
             </a:r>
             <a:r>
               <a:rPr lang="en-US" dirty="0"/>
-              <a:t> for </a:t>
+              <a:t>for </a:t>
             </a:r>
             <a:r>
               <a:rPr lang="en-US" dirty="0" smtClean="0"/>
@@ -4055,13 +4030,14 @@
               <a:t>User stories are entered in </a:t>
             </a:r>
             <a:r>
-              <a:rPr lang="en-US" dirty="0" err="1" smtClean="0"/>
-              <a:t>Gforge</a:t>
+              <a:rPr lang="en-US" dirty="0" smtClean="0"/>
+              <a:t>GForge</a:t>
             </a:r>
             <a:r>
               <a:rPr lang="en-US" dirty="0" smtClean="0"/>
               <a:t>.</a:t>
             </a:r>
+            <a:endParaRPr lang="en-US" dirty="0" smtClean="0"/>
           </a:p>
           <a:p>
             <a:r>
@@ -4069,13 +4045,10 @@
               <a:t>User Story is assigned to an </a:t>
             </a:r>
             <a:r>
-              <a:rPr lang="en-US" dirty="0" err="1" smtClean="0"/>
-              <a:t>implementor</a:t>
-            </a:r>
-            <a:r>
-              <a:rPr lang="en-US" dirty="0" smtClean="0"/>
-              <a:t>.</a:t>
-            </a:r>
+              <a:rPr lang="en-US" dirty="0" smtClean="0"/>
+              <a:t>implementer.</a:t>
+            </a:r>
+            <a:endParaRPr lang="en-US" dirty="0" smtClean="0"/>
           </a:p>
           <a:p>
             <a:r>
@@ -4083,13 +4056,10 @@
               <a:t>“Approach Brainstorming” meeting arranged by </a:t>
             </a:r>
             <a:r>
-              <a:rPr lang="en-US" dirty="0" err="1" smtClean="0"/>
-              <a:t>implementor</a:t>
-            </a:r>
-            <a:r>
-              <a:rPr lang="en-US" dirty="0" smtClean="0"/>
-              <a:t>.</a:t>
-            </a:r>
+              <a:rPr lang="en-US" dirty="0" smtClean="0"/>
+              <a:t>implementer.</a:t>
+            </a:r>
+            <a:endParaRPr lang="en-US" dirty="0" smtClean="0"/>
           </a:p>
           <a:p>
             <a:r>

</xml_diff>